<commit_message>
Update Presentación del acuario.pptx
</commit_message>
<xml_diff>
--- a/PapelesDeTrabajo/Presentación del acuario.pptx
+++ b/PapelesDeTrabajo/Presentación del acuario.pptx
@@ -143,7 +143,7 @@
           <p:cNvPr id="2" name="Título 1">
             <a:extLst>
               <a:ext uri="{FF2B5EF4-FFF2-40B4-BE49-F238E27FC236}">
-                <a16:creationId xmlns:a16="http://schemas.microsoft.com/office/drawing/2014/main" xmlns="" id="{75E5783D-515E-4883-B62D-265EBFA915F1}"/>
+                <a16:creationId xmlns:a16="http://schemas.microsoft.com/office/drawing/2014/main" id="{75E5783D-515E-4883-B62D-265EBFA915F1}"/>
               </a:ext>
             </a:extLst>
           </p:cNvPr>
@@ -181,7 +181,7 @@
           <p:cNvPr id="3" name="Subtítulo 2">
             <a:extLst>
               <a:ext uri="{FF2B5EF4-FFF2-40B4-BE49-F238E27FC236}">
-                <a16:creationId xmlns:a16="http://schemas.microsoft.com/office/drawing/2014/main" xmlns="" id="{CF5510C3-4B7F-4BDE-8FF4-B6ADC401EF74}"/>
+                <a16:creationId xmlns:a16="http://schemas.microsoft.com/office/drawing/2014/main" id="{CF5510C3-4B7F-4BDE-8FF4-B6ADC401EF74}"/>
               </a:ext>
             </a:extLst>
           </p:cNvPr>
@@ -252,7 +252,7 @@
           <p:cNvPr id="4" name="Marcador de fecha 3">
             <a:extLst>
               <a:ext uri="{FF2B5EF4-FFF2-40B4-BE49-F238E27FC236}">
-                <a16:creationId xmlns:a16="http://schemas.microsoft.com/office/drawing/2014/main" xmlns="" id="{F55EED9F-B0E9-42B4-B762-DE5A2F921FD5}"/>
+                <a16:creationId xmlns:a16="http://schemas.microsoft.com/office/drawing/2014/main" id="{F55EED9F-B0E9-42B4-B762-DE5A2F921FD5}"/>
               </a:ext>
             </a:extLst>
           </p:cNvPr>
@@ -281,7 +281,7 @@
           <p:cNvPr id="5" name="Marcador de pie de página 4">
             <a:extLst>
               <a:ext uri="{FF2B5EF4-FFF2-40B4-BE49-F238E27FC236}">
-                <a16:creationId xmlns:a16="http://schemas.microsoft.com/office/drawing/2014/main" xmlns="" id="{CC865E83-9F30-44EA-8032-7A996CBAD0A6}"/>
+                <a16:creationId xmlns:a16="http://schemas.microsoft.com/office/drawing/2014/main" id="{CC865E83-9F30-44EA-8032-7A996CBAD0A6}"/>
               </a:ext>
             </a:extLst>
           </p:cNvPr>
@@ -306,7 +306,7 @@
           <p:cNvPr id="6" name="Marcador de número de diapositiva 5">
             <a:extLst>
               <a:ext uri="{FF2B5EF4-FFF2-40B4-BE49-F238E27FC236}">
-                <a16:creationId xmlns:a16="http://schemas.microsoft.com/office/drawing/2014/main" xmlns="" id="{D1DC1DC1-AE07-4CCE-BE09-7667E15B4841}"/>
+                <a16:creationId xmlns:a16="http://schemas.microsoft.com/office/drawing/2014/main" id="{D1DC1DC1-AE07-4CCE-BE09-7667E15B4841}"/>
               </a:ext>
             </a:extLst>
           </p:cNvPr>
@@ -365,7 +365,7 @@
           <p:cNvPr id="2" name="Título 1">
             <a:extLst>
               <a:ext uri="{FF2B5EF4-FFF2-40B4-BE49-F238E27FC236}">
-                <a16:creationId xmlns:a16="http://schemas.microsoft.com/office/drawing/2014/main" xmlns="" id="{263BA694-1337-4EAB-848E-AEAF3C467F4E}"/>
+                <a16:creationId xmlns:a16="http://schemas.microsoft.com/office/drawing/2014/main" id="{263BA694-1337-4EAB-848E-AEAF3C467F4E}"/>
               </a:ext>
             </a:extLst>
           </p:cNvPr>
@@ -394,7 +394,7 @@
           <p:cNvPr id="3" name="Marcador de texto vertical 2">
             <a:extLst>
               <a:ext uri="{FF2B5EF4-FFF2-40B4-BE49-F238E27FC236}">
-                <a16:creationId xmlns:a16="http://schemas.microsoft.com/office/drawing/2014/main" xmlns="" id="{3ACB86B8-8978-40DF-BA74-5772D8634FAE}"/>
+                <a16:creationId xmlns:a16="http://schemas.microsoft.com/office/drawing/2014/main" id="{3ACB86B8-8978-40DF-BA74-5772D8634FAE}"/>
               </a:ext>
             </a:extLst>
           </p:cNvPr>
@@ -452,7 +452,7 @@
           <p:cNvPr id="4" name="Marcador de fecha 3">
             <a:extLst>
               <a:ext uri="{FF2B5EF4-FFF2-40B4-BE49-F238E27FC236}">
-                <a16:creationId xmlns:a16="http://schemas.microsoft.com/office/drawing/2014/main" xmlns="" id="{DFCF62E9-59FD-4A1E-B798-3475C0EDA1B6}"/>
+                <a16:creationId xmlns:a16="http://schemas.microsoft.com/office/drawing/2014/main" id="{DFCF62E9-59FD-4A1E-B798-3475C0EDA1B6}"/>
               </a:ext>
             </a:extLst>
           </p:cNvPr>
@@ -481,7 +481,7 @@
           <p:cNvPr id="5" name="Marcador de pie de página 4">
             <a:extLst>
               <a:ext uri="{FF2B5EF4-FFF2-40B4-BE49-F238E27FC236}">
-                <a16:creationId xmlns:a16="http://schemas.microsoft.com/office/drawing/2014/main" xmlns="" id="{D4294584-E894-4977-8526-355259582041}"/>
+                <a16:creationId xmlns:a16="http://schemas.microsoft.com/office/drawing/2014/main" id="{D4294584-E894-4977-8526-355259582041}"/>
               </a:ext>
             </a:extLst>
           </p:cNvPr>
@@ -506,7 +506,7 @@
           <p:cNvPr id="6" name="Marcador de número de diapositiva 5">
             <a:extLst>
               <a:ext uri="{FF2B5EF4-FFF2-40B4-BE49-F238E27FC236}">
-                <a16:creationId xmlns:a16="http://schemas.microsoft.com/office/drawing/2014/main" xmlns="" id="{6CE9E180-4CAF-464F-AD54-62B4F87C5131}"/>
+                <a16:creationId xmlns:a16="http://schemas.microsoft.com/office/drawing/2014/main" id="{6CE9E180-4CAF-464F-AD54-62B4F87C5131}"/>
               </a:ext>
             </a:extLst>
           </p:cNvPr>
@@ -565,7 +565,7 @@
           <p:cNvPr id="2" name="Título vertical 1">
             <a:extLst>
               <a:ext uri="{FF2B5EF4-FFF2-40B4-BE49-F238E27FC236}">
-                <a16:creationId xmlns:a16="http://schemas.microsoft.com/office/drawing/2014/main" xmlns="" id="{FBAC12AC-6FB3-4EB6-BDD5-60DDF8623F1C}"/>
+                <a16:creationId xmlns:a16="http://schemas.microsoft.com/office/drawing/2014/main" id="{FBAC12AC-6FB3-4EB6-BDD5-60DDF8623F1C}"/>
               </a:ext>
             </a:extLst>
           </p:cNvPr>
@@ -599,7 +599,7 @@
           <p:cNvPr id="3" name="Marcador de texto vertical 2">
             <a:extLst>
               <a:ext uri="{FF2B5EF4-FFF2-40B4-BE49-F238E27FC236}">
-                <a16:creationId xmlns:a16="http://schemas.microsoft.com/office/drawing/2014/main" xmlns="" id="{C6A8ED97-76DE-4C99-8B52-A4959C9EAA11}"/>
+                <a16:creationId xmlns:a16="http://schemas.microsoft.com/office/drawing/2014/main" id="{C6A8ED97-76DE-4C99-8B52-A4959C9EAA11}"/>
               </a:ext>
             </a:extLst>
           </p:cNvPr>
@@ -662,7 +662,7 @@
           <p:cNvPr id="4" name="Marcador de fecha 3">
             <a:extLst>
               <a:ext uri="{FF2B5EF4-FFF2-40B4-BE49-F238E27FC236}">
-                <a16:creationId xmlns:a16="http://schemas.microsoft.com/office/drawing/2014/main" xmlns="" id="{5CCAF4D1-4340-4BFC-8D40-D727301B9F31}"/>
+                <a16:creationId xmlns:a16="http://schemas.microsoft.com/office/drawing/2014/main" id="{5CCAF4D1-4340-4BFC-8D40-D727301B9F31}"/>
               </a:ext>
             </a:extLst>
           </p:cNvPr>
@@ -691,7 +691,7 @@
           <p:cNvPr id="5" name="Marcador de pie de página 4">
             <a:extLst>
               <a:ext uri="{FF2B5EF4-FFF2-40B4-BE49-F238E27FC236}">
-                <a16:creationId xmlns:a16="http://schemas.microsoft.com/office/drawing/2014/main" xmlns="" id="{D3662BC3-C1C3-4440-9938-7B1AE3945A71}"/>
+                <a16:creationId xmlns:a16="http://schemas.microsoft.com/office/drawing/2014/main" id="{D3662BC3-C1C3-4440-9938-7B1AE3945A71}"/>
               </a:ext>
             </a:extLst>
           </p:cNvPr>
@@ -716,7 +716,7 @@
           <p:cNvPr id="6" name="Marcador de número de diapositiva 5">
             <a:extLst>
               <a:ext uri="{FF2B5EF4-FFF2-40B4-BE49-F238E27FC236}">
-                <a16:creationId xmlns:a16="http://schemas.microsoft.com/office/drawing/2014/main" xmlns="" id="{31CBA67A-A6CB-41C4-A50D-6192904ADA46}"/>
+                <a16:creationId xmlns:a16="http://schemas.microsoft.com/office/drawing/2014/main" id="{31CBA67A-A6CB-41C4-A50D-6192904ADA46}"/>
               </a:ext>
             </a:extLst>
           </p:cNvPr>
@@ -775,7 +775,7 @@
           <p:cNvPr id="2" name="Título 1">
             <a:extLst>
               <a:ext uri="{FF2B5EF4-FFF2-40B4-BE49-F238E27FC236}">
-                <a16:creationId xmlns:a16="http://schemas.microsoft.com/office/drawing/2014/main" xmlns="" id="{198D837E-C8BF-4F3E-9B2C-261A55EB3A0A}"/>
+                <a16:creationId xmlns:a16="http://schemas.microsoft.com/office/drawing/2014/main" id="{198D837E-C8BF-4F3E-9B2C-261A55EB3A0A}"/>
               </a:ext>
             </a:extLst>
           </p:cNvPr>
@@ -804,7 +804,7 @@
           <p:cNvPr id="3" name="Marcador de contenido 2">
             <a:extLst>
               <a:ext uri="{FF2B5EF4-FFF2-40B4-BE49-F238E27FC236}">
-                <a16:creationId xmlns:a16="http://schemas.microsoft.com/office/drawing/2014/main" xmlns="" id="{97C0C3BA-5CF9-4323-8745-E12FBC7D143E}"/>
+                <a16:creationId xmlns:a16="http://schemas.microsoft.com/office/drawing/2014/main" id="{97C0C3BA-5CF9-4323-8745-E12FBC7D143E}"/>
               </a:ext>
             </a:extLst>
           </p:cNvPr>
@@ -862,7 +862,7 @@
           <p:cNvPr id="4" name="Marcador de fecha 3">
             <a:extLst>
               <a:ext uri="{FF2B5EF4-FFF2-40B4-BE49-F238E27FC236}">
-                <a16:creationId xmlns:a16="http://schemas.microsoft.com/office/drawing/2014/main" xmlns="" id="{A9A1131A-C803-4BDD-87D6-39CDB5F91553}"/>
+                <a16:creationId xmlns:a16="http://schemas.microsoft.com/office/drawing/2014/main" id="{A9A1131A-C803-4BDD-87D6-39CDB5F91553}"/>
               </a:ext>
             </a:extLst>
           </p:cNvPr>
@@ -891,7 +891,7 @@
           <p:cNvPr id="5" name="Marcador de pie de página 4">
             <a:extLst>
               <a:ext uri="{FF2B5EF4-FFF2-40B4-BE49-F238E27FC236}">
-                <a16:creationId xmlns:a16="http://schemas.microsoft.com/office/drawing/2014/main" xmlns="" id="{2EC2C05A-78C4-4376-8280-D3BD638FC029}"/>
+                <a16:creationId xmlns:a16="http://schemas.microsoft.com/office/drawing/2014/main" id="{2EC2C05A-78C4-4376-8280-D3BD638FC029}"/>
               </a:ext>
             </a:extLst>
           </p:cNvPr>
@@ -916,7 +916,7 @@
           <p:cNvPr id="6" name="Marcador de número de diapositiva 5">
             <a:extLst>
               <a:ext uri="{FF2B5EF4-FFF2-40B4-BE49-F238E27FC236}">
-                <a16:creationId xmlns:a16="http://schemas.microsoft.com/office/drawing/2014/main" xmlns="" id="{A2C163FD-844E-4D35-9AED-DBA5934D373A}"/>
+                <a16:creationId xmlns:a16="http://schemas.microsoft.com/office/drawing/2014/main" id="{A2C163FD-844E-4D35-9AED-DBA5934D373A}"/>
               </a:ext>
             </a:extLst>
           </p:cNvPr>
@@ -975,7 +975,7 @@
           <p:cNvPr id="2" name="Título 1">
             <a:extLst>
               <a:ext uri="{FF2B5EF4-FFF2-40B4-BE49-F238E27FC236}">
-                <a16:creationId xmlns:a16="http://schemas.microsoft.com/office/drawing/2014/main" xmlns="" id="{C63913C9-637F-4FCE-B5A4-4B6A407EA3FF}"/>
+                <a16:creationId xmlns:a16="http://schemas.microsoft.com/office/drawing/2014/main" id="{C63913C9-637F-4FCE-B5A4-4B6A407EA3FF}"/>
               </a:ext>
             </a:extLst>
           </p:cNvPr>
@@ -1013,7 +1013,7 @@
           <p:cNvPr id="3" name="Marcador de texto 2">
             <a:extLst>
               <a:ext uri="{FF2B5EF4-FFF2-40B4-BE49-F238E27FC236}">
-                <a16:creationId xmlns:a16="http://schemas.microsoft.com/office/drawing/2014/main" xmlns="" id="{FF593587-F68E-4598-B721-E40F68AB340D}"/>
+                <a16:creationId xmlns:a16="http://schemas.microsoft.com/office/drawing/2014/main" id="{FF593587-F68E-4598-B721-E40F68AB340D}"/>
               </a:ext>
             </a:extLst>
           </p:cNvPr>
@@ -1138,7 +1138,7 @@
           <p:cNvPr id="4" name="Marcador de fecha 3">
             <a:extLst>
               <a:ext uri="{FF2B5EF4-FFF2-40B4-BE49-F238E27FC236}">
-                <a16:creationId xmlns:a16="http://schemas.microsoft.com/office/drawing/2014/main" xmlns="" id="{22C6CA59-DFB7-4CAE-98C3-54D12C3F729B}"/>
+                <a16:creationId xmlns:a16="http://schemas.microsoft.com/office/drawing/2014/main" id="{22C6CA59-DFB7-4CAE-98C3-54D12C3F729B}"/>
               </a:ext>
             </a:extLst>
           </p:cNvPr>
@@ -1167,7 +1167,7 @@
           <p:cNvPr id="5" name="Marcador de pie de página 4">
             <a:extLst>
               <a:ext uri="{FF2B5EF4-FFF2-40B4-BE49-F238E27FC236}">
-                <a16:creationId xmlns:a16="http://schemas.microsoft.com/office/drawing/2014/main" xmlns="" id="{8C0CE660-4228-41C8-8C16-CEC1D5436CAE}"/>
+                <a16:creationId xmlns:a16="http://schemas.microsoft.com/office/drawing/2014/main" id="{8C0CE660-4228-41C8-8C16-CEC1D5436CAE}"/>
               </a:ext>
             </a:extLst>
           </p:cNvPr>
@@ -1192,7 +1192,7 @@
           <p:cNvPr id="6" name="Marcador de número de diapositiva 5">
             <a:extLst>
               <a:ext uri="{FF2B5EF4-FFF2-40B4-BE49-F238E27FC236}">
-                <a16:creationId xmlns:a16="http://schemas.microsoft.com/office/drawing/2014/main" xmlns="" id="{FC49142E-8B75-4037-8314-065AB0343656}"/>
+                <a16:creationId xmlns:a16="http://schemas.microsoft.com/office/drawing/2014/main" id="{FC49142E-8B75-4037-8314-065AB0343656}"/>
               </a:ext>
             </a:extLst>
           </p:cNvPr>
@@ -1251,7 +1251,7 @@
           <p:cNvPr id="2" name="Título 1">
             <a:extLst>
               <a:ext uri="{FF2B5EF4-FFF2-40B4-BE49-F238E27FC236}">
-                <a16:creationId xmlns:a16="http://schemas.microsoft.com/office/drawing/2014/main" xmlns="" id="{C1608A53-B7B4-4130-A39F-BBA0AD2853B7}"/>
+                <a16:creationId xmlns:a16="http://schemas.microsoft.com/office/drawing/2014/main" id="{C1608A53-B7B4-4130-A39F-BBA0AD2853B7}"/>
               </a:ext>
             </a:extLst>
           </p:cNvPr>
@@ -1280,7 +1280,7 @@
           <p:cNvPr id="3" name="Marcador de contenido 2">
             <a:extLst>
               <a:ext uri="{FF2B5EF4-FFF2-40B4-BE49-F238E27FC236}">
-                <a16:creationId xmlns:a16="http://schemas.microsoft.com/office/drawing/2014/main" xmlns="" id="{2B2D84FA-4691-4B83-9E4E-68991CA7869F}"/>
+                <a16:creationId xmlns:a16="http://schemas.microsoft.com/office/drawing/2014/main" id="{2B2D84FA-4691-4B83-9E4E-68991CA7869F}"/>
               </a:ext>
             </a:extLst>
           </p:cNvPr>
@@ -1343,7 +1343,7 @@
           <p:cNvPr id="4" name="Marcador de contenido 3">
             <a:extLst>
               <a:ext uri="{FF2B5EF4-FFF2-40B4-BE49-F238E27FC236}">
-                <a16:creationId xmlns:a16="http://schemas.microsoft.com/office/drawing/2014/main" xmlns="" id="{496D7400-295B-415B-B08B-C5215AE52461}"/>
+                <a16:creationId xmlns:a16="http://schemas.microsoft.com/office/drawing/2014/main" id="{496D7400-295B-415B-B08B-C5215AE52461}"/>
               </a:ext>
             </a:extLst>
           </p:cNvPr>
@@ -1406,7 +1406,7 @@
           <p:cNvPr id="5" name="Marcador de fecha 4">
             <a:extLst>
               <a:ext uri="{FF2B5EF4-FFF2-40B4-BE49-F238E27FC236}">
-                <a16:creationId xmlns:a16="http://schemas.microsoft.com/office/drawing/2014/main" xmlns="" id="{89C79FB3-062A-49E3-B1CB-57ED99171756}"/>
+                <a16:creationId xmlns:a16="http://schemas.microsoft.com/office/drawing/2014/main" id="{89C79FB3-062A-49E3-B1CB-57ED99171756}"/>
               </a:ext>
             </a:extLst>
           </p:cNvPr>
@@ -1435,7 +1435,7 @@
           <p:cNvPr id="6" name="Marcador de pie de página 5">
             <a:extLst>
               <a:ext uri="{FF2B5EF4-FFF2-40B4-BE49-F238E27FC236}">
-                <a16:creationId xmlns:a16="http://schemas.microsoft.com/office/drawing/2014/main" xmlns="" id="{0D30C914-9225-4804-A3E1-30DC6BEF6267}"/>
+                <a16:creationId xmlns:a16="http://schemas.microsoft.com/office/drawing/2014/main" id="{0D30C914-9225-4804-A3E1-30DC6BEF6267}"/>
               </a:ext>
             </a:extLst>
           </p:cNvPr>
@@ -1460,7 +1460,7 @@
           <p:cNvPr id="7" name="Marcador de número de diapositiva 6">
             <a:extLst>
               <a:ext uri="{FF2B5EF4-FFF2-40B4-BE49-F238E27FC236}">
-                <a16:creationId xmlns:a16="http://schemas.microsoft.com/office/drawing/2014/main" xmlns="" id="{53638CE1-A2F9-400E-98DC-F2876F2FCD3D}"/>
+                <a16:creationId xmlns:a16="http://schemas.microsoft.com/office/drawing/2014/main" id="{53638CE1-A2F9-400E-98DC-F2876F2FCD3D}"/>
               </a:ext>
             </a:extLst>
           </p:cNvPr>
@@ -1519,7 +1519,7 @@
           <p:cNvPr id="2" name="Título 1">
             <a:extLst>
               <a:ext uri="{FF2B5EF4-FFF2-40B4-BE49-F238E27FC236}">
-                <a16:creationId xmlns:a16="http://schemas.microsoft.com/office/drawing/2014/main" xmlns="" id="{7AEF6C0C-8E8E-412D-AB75-9DD308740023}"/>
+                <a16:creationId xmlns:a16="http://schemas.microsoft.com/office/drawing/2014/main" id="{7AEF6C0C-8E8E-412D-AB75-9DD308740023}"/>
               </a:ext>
             </a:extLst>
           </p:cNvPr>
@@ -1553,7 +1553,7 @@
           <p:cNvPr id="3" name="Marcador de texto 2">
             <a:extLst>
               <a:ext uri="{FF2B5EF4-FFF2-40B4-BE49-F238E27FC236}">
-                <a16:creationId xmlns:a16="http://schemas.microsoft.com/office/drawing/2014/main" xmlns="" id="{1A5C4DC5-65B3-411A-85F3-8E1DF3E22566}"/>
+                <a16:creationId xmlns:a16="http://schemas.microsoft.com/office/drawing/2014/main" id="{1A5C4DC5-65B3-411A-85F3-8E1DF3E22566}"/>
               </a:ext>
             </a:extLst>
           </p:cNvPr>
@@ -1624,7 +1624,7 @@
           <p:cNvPr id="4" name="Marcador de contenido 3">
             <a:extLst>
               <a:ext uri="{FF2B5EF4-FFF2-40B4-BE49-F238E27FC236}">
-                <a16:creationId xmlns:a16="http://schemas.microsoft.com/office/drawing/2014/main" xmlns="" id="{E14B102D-D0A0-4402-9D42-BF11AD335705}"/>
+                <a16:creationId xmlns:a16="http://schemas.microsoft.com/office/drawing/2014/main" id="{E14B102D-D0A0-4402-9D42-BF11AD335705}"/>
               </a:ext>
             </a:extLst>
           </p:cNvPr>
@@ -1687,7 +1687,7 @@
           <p:cNvPr id="5" name="Marcador de texto 4">
             <a:extLst>
               <a:ext uri="{FF2B5EF4-FFF2-40B4-BE49-F238E27FC236}">
-                <a16:creationId xmlns:a16="http://schemas.microsoft.com/office/drawing/2014/main" xmlns="" id="{402E5ACF-3BCD-4D78-B354-8AD68B667AC8}"/>
+                <a16:creationId xmlns:a16="http://schemas.microsoft.com/office/drawing/2014/main" id="{402E5ACF-3BCD-4D78-B354-8AD68B667AC8}"/>
               </a:ext>
             </a:extLst>
           </p:cNvPr>
@@ -1758,7 +1758,7 @@
           <p:cNvPr id="6" name="Marcador de contenido 5">
             <a:extLst>
               <a:ext uri="{FF2B5EF4-FFF2-40B4-BE49-F238E27FC236}">
-                <a16:creationId xmlns:a16="http://schemas.microsoft.com/office/drawing/2014/main" xmlns="" id="{41847502-6C04-4729-929E-E260D5DAE496}"/>
+                <a16:creationId xmlns:a16="http://schemas.microsoft.com/office/drawing/2014/main" id="{41847502-6C04-4729-929E-E260D5DAE496}"/>
               </a:ext>
             </a:extLst>
           </p:cNvPr>
@@ -1821,7 +1821,7 @@
           <p:cNvPr id="7" name="Marcador de fecha 6">
             <a:extLst>
               <a:ext uri="{FF2B5EF4-FFF2-40B4-BE49-F238E27FC236}">
-                <a16:creationId xmlns:a16="http://schemas.microsoft.com/office/drawing/2014/main" xmlns="" id="{0040745B-437E-4756-815D-98498EFADB36}"/>
+                <a16:creationId xmlns:a16="http://schemas.microsoft.com/office/drawing/2014/main" id="{0040745B-437E-4756-815D-98498EFADB36}"/>
               </a:ext>
             </a:extLst>
           </p:cNvPr>
@@ -1850,7 +1850,7 @@
           <p:cNvPr id="8" name="Marcador de pie de página 7">
             <a:extLst>
               <a:ext uri="{FF2B5EF4-FFF2-40B4-BE49-F238E27FC236}">
-                <a16:creationId xmlns:a16="http://schemas.microsoft.com/office/drawing/2014/main" xmlns="" id="{DF1DE2A3-ED25-4DD7-ACB4-C49EE645BD97}"/>
+                <a16:creationId xmlns:a16="http://schemas.microsoft.com/office/drawing/2014/main" id="{DF1DE2A3-ED25-4DD7-ACB4-C49EE645BD97}"/>
               </a:ext>
             </a:extLst>
           </p:cNvPr>
@@ -1875,7 +1875,7 @@
           <p:cNvPr id="9" name="Marcador de número de diapositiva 8">
             <a:extLst>
               <a:ext uri="{FF2B5EF4-FFF2-40B4-BE49-F238E27FC236}">
-                <a16:creationId xmlns:a16="http://schemas.microsoft.com/office/drawing/2014/main" xmlns="" id="{E0CBA6E6-5B6C-4FF7-8223-B80DC8FE5F69}"/>
+                <a16:creationId xmlns:a16="http://schemas.microsoft.com/office/drawing/2014/main" id="{E0CBA6E6-5B6C-4FF7-8223-B80DC8FE5F69}"/>
               </a:ext>
             </a:extLst>
           </p:cNvPr>
@@ -1934,7 +1934,7 @@
           <p:cNvPr id="2" name="Título 1">
             <a:extLst>
               <a:ext uri="{FF2B5EF4-FFF2-40B4-BE49-F238E27FC236}">
-                <a16:creationId xmlns:a16="http://schemas.microsoft.com/office/drawing/2014/main" xmlns="" id="{95905DEE-B254-45C6-AA17-4A07AB74B119}"/>
+                <a16:creationId xmlns:a16="http://schemas.microsoft.com/office/drawing/2014/main" id="{95905DEE-B254-45C6-AA17-4A07AB74B119}"/>
               </a:ext>
             </a:extLst>
           </p:cNvPr>
@@ -1963,7 +1963,7 @@
           <p:cNvPr id="3" name="Marcador de fecha 2">
             <a:extLst>
               <a:ext uri="{FF2B5EF4-FFF2-40B4-BE49-F238E27FC236}">
-                <a16:creationId xmlns:a16="http://schemas.microsoft.com/office/drawing/2014/main" xmlns="" id="{71A64A24-4687-4236-94B2-FA4C118C9840}"/>
+                <a16:creationId xmlns:a16="http://schemas.microsoft.com/office/drawing/2014/main" id="{71A64A24-4687-4236-94B2-FA4C118C9840}"/>
               </a:ext>
             </a:extLst>
           </p:cNvPr>
@@ -1992,7 +1992,7 @@
           <p:cNvPr id="4" name="Marcador de pie de página 3">
             <a:extLst>
               <a:ext uri="{FF2B5EF4-FFF2-40B4-BE49-F238E27FC236}">
-                <a16:creationId xmlns:a16="http://schemas.microsoft.com/office/drawing/2014/main" xmlns="" id="{C5FDFD6B-F0D3-4D8B-9069-7C11BB8F10F6}"/>
+                <a16:creationId xmlns:a16="http://schemas.microsoft.com/office/drawing/2014/main" id="{C5FDFD6B-F0D3-4D8B-9069-7C11BB8F10F6}"/>
               </a:ext>
             </a:extLst>
           </p:cNvPr>
@@ -2017,7 +2017,7 @@
           <p:cNvPr id="5" name="Marcador de número de diapositiva 4">
             <a:extLst>
               <a:ext uri="{FF2B5EF4-FFF2-40B4-BE49-F238E27FC236}">
-                <a16:creationId xmlns:a16="http://schemas.microsoft.com/office/drawing/2014/main" xmlns="" id="{26BA5DC2-19FB-4DC8-9875-4B8F8D9C05F5}"/>
+                <a16:creationId xmlns:a16="http://schemas.microsoft.com/office/drawing/2014/main" id="{26BA5DC2-19FB-4DC8-9875-4B8F8D9C05F5}"/>
               </a:ext>
             </a:extLst>
           </p:cNvPr>
@@ -2076,7 +2076,7 @@
           <p:cNvPr id="2" name="Marcador de fecha 1">
             <a:extLst>
               <a:ext uri="{FF2B5EF4-FFF2-40B4-BE49-F238E27FC236}">
-                <a16:creationId xmlns:a16="http://schemas.microsoft.com/office/drawing/2014/main" xmlns="" id="{EE359EF3-517C-4A81-92C7-5D6F15A106C6}"/>
+                <a16:creationId xmlns:a16="http://schemas.microsoft.com/office/drawing/2014/main" id="{EE359EF3-517C-4A81-92C7-5D6F15A106C6}"/>
               </a:ext>
             </a:extLst>
           </p:cNvPr>
@@ -2105,7 +2105,7 @@
           <p:cNvPr id="3" name="Marcador de pie de página 2">
             <a:extLst>
               <a:ext uri="{FF2B5EF4-FFF2-40B4-BE49-F238E27FC236}">
-                <a16:creationId xmlns:a16="http://schemas.microsoft.com/office/drawing/2014/main" xmlns="" id="{462A4F2B-FE52-4B6E-948C-19EDF253651F}"/>
+                <a16:creationId xmlns:a16="http://schemas.microsoft.com/office/drawing/2014/main" id="{462A4F2B-FE52-4B6E-948C-19EDF253651F}"/>
               </a:ext>
             </a:extLst>
           </p:cNvPr>
@@ -2130,7 +2130,7 @@
           <p:cNvPr id="4" name="Marcador de número de diapositiva 3">
             <a:extLst>
               <a:ext uri="{FF2B5EF4-FFF2-40B4-BE49-F238E27FC236}">
-                <a16:creationId xmlns:a16="http://schemas.microsoft.com/office/drawing/2014/main" xmlns="" id="{AEF78AA7-E547-44E8-A1BB-3A708C24B445}"/>
+                <a16:creationId xmlns:a16="http://schemas.microsoft.com/office/drawing/2014/main" id="{AEF78AA7-E547-44E8-A1BB-3A708C24B445}"/>
               </a:ext>
             </a:extLst>
           </p:cNvPr>
@@ -2189,7 +2189,7 @@
           <p:cNvPr id="2" name="Título 1">
             <a:extLst>
               <a:ext uri="{FF2B5EF4-FFF2-40B4-BE49-F238E27FC236}">
-                <a16:creationId xmlns:a16="http://schemas.microsoft.com/office/drawing/2014/main" xmlns="" id="{391C4E3A-C713-457E-BDCB-D61905235E4C}"/>
+                <a16:creationId xmlns:a16="http://schemas.microsoft.com/office/drawing/2014/main" id="{391C4E3A-C713-457E-BDCB-D61905235E4C}"/>
               </a:ext>
             </a:extLst>
           </p:cNvPr>
@@ -2227,7 +2227,7 @@
           <p:cNvPr id="3" name="Marcador de contenido 2">
             <a:extLst>
               <a:ext uri="{FF2B5EF4-FFF2-40B4-BE49-F238E27FC236}">
-                <a16:creationId xmlns:a16="http://schemas.microsoft.com/office/drawing/2014/main" xmlns="" id="{2A62652A-3C6B-4685-9CB1-B73B676F87C2}"/>
+                <a16:creationId xmlns:a16="http://schemas.microsoft.com/office/drawing/2014/main" id="{2A62652A-3C6B-4685-9CB1-B73B676F87C2}"/>
               </a:ext>
             </a:extLst>
           </p:cNvPr>
@@ -2318,7 +2318,7 @@
           <p:cNvPr id="4" name="Marcador de texto 3">
             <a:extLst>
               <a:ext uri="{FF2B5EF4-FFF2-40B4-BE49-F238E27FC236}">
-                <a16:creationId xmlns:a16="http://schemas.microsoft.com/office/drawing/2014/main" xmlns="" id="{FF698DF8-478C-494D-8886-E70922B1C1C1}"/>
+                <a16:creationId xmlns:a16="http://schemas.microsoft.com/office/drawing/2014/main" id="{FF698DF8-478C-494D-8886-E70922B1C1C1}"/>
               </a:ext>
             </a:extLst>
           </p:cNvPr>
@@ -2389,7 +2389,7 @@
           <p:cNvPr id="5" name="Marcador de fecha 4">
             <a:extLst>
               <a:ext uri="{FF2B5EF4-FFF2-40B4-BE49-F238E27FC236}">
-                <a16:creationId xmlns:a16="http://schemas.microsoft.com/office/drawing/2014/main" xmlns="" id="{09E777BC-4A71-4CD4-9CE3-702DDFD23372}"/>
+                <a16:creationId xmlns:a16="http://schemas.microsoft.com/office/drawing/2014/main" id="{09E777BC-4A71-4CD4-9CE3-702DDFD23372}"/>
               </a:ext>
             </a:extLst>
           </p:cNvPr>
@@ -2418,7 +2418,7 @@
           <p:cNvPr id="6" name="Marcador de pie de página 5">
             <a:extLst>
               <a:ext uri="{FF2B5EF4-FFF2-40B4-BE49-F238E27FC236}">
-                <a16:creationId xmlns:a16="http://schemas.microsoft.com/office/drawing/2014/main" xmlns="" id="{D11513A2-1704-48EF-A8E2-644C93619554}"/>
+                <a16:creationId xmlns:a16="http://schemas.microsoft.com/office/drawing/2014/main" id="{D11513A2-1704-48EF-A8E2-644C93619554}"/>
               </a:ext>
             </a:extLst>
           </p:cNvPr>
@@ -2443,7 +2443,7 @@
           <p:cNvPr id="7" name="Marcador de número de diapositiva 6">
             <a:extLst>
               <a:ext uri="{FF2B5EF4-FFF2-40B4-BE49-F238E27FC236}">
-                <a16:creationId xmlns:a16="http://schemas.microsoft.com/office/drawing/2014/main" xmlns="" id="{7894F752-9558-4039-A2B4-49C03021C1BE}"/>
+                <a16:creationId xmlns:a16="http://schemas.microsoft.com/office/drawing/2014/main" id="{7894F752-9558-4039-A2B4-49C03021C1BE}"/>
               </a:ext>
             </a:extLst>
           </p:cNvPr>
@@ -2502,7 +2502,7 @@
           <p:cNvPr id="2" name="Título 1">
             <a:extLst>
               <a:ext uri="{FF2B5EF4-FFF2-40B4-BE49-F238E27FC236}">
-                <a16:creationId xmlns:a16="http://schemas.microsoft.com/office/drawing/2014/main" xmlns="" id="{2A0EC260-A1E7-4FE4-9060-36CBD66A9A3B}"/>
+                <a16:creationId xmlns:a16="http://schemas.microsoft.com/office/drawing/2014/main" id="{2A0EC260-A1E7-4FE4-9060-36CBD66A9A3B}"/>
               </a:ext>
             </a:extLst>
           </p:cNvPr>
@@ -2540,7 +2540,7 @@
           <p:cNvPr id="3" name="Marcador de posición de imagen 2">
             <a:extLst>
               <a:ext uri="{FF2B5EF4-FFF2-40B4-BE49-F238E27FC236}">
-                <a16:creationId xmlns:a16="http://schemas.microsoft.com/office/drawing/2014/main" xmlns="" id="{A24E91EA-F9F2-42F8-8FCB-246692021508}"/>
+                <a16:creationId xmlns:a16="http://schemas.microsoft.com/office/drawing/2014/main" id="{A24E91EA-F9F2-42F8-8FCB-246692021508}"/>
               </a:ext>
             </a:extLst>
           </p:cNvPr>
@@ -2607,7 +2607,7 @@
           <p:cNvPr id="4" name="Marcador de texto 3">
             <a:extLst>
               <a:ext uri="{FF2B5EF4-FFF2-40B4-BE49-F238E27FC236}">
-                <a16:creationId xmlns:a16="http://schemas.microsoft.com/office/drawing/2014/main" xmlns="" id="{BA27B211-5A8A-4FB1-957E-88EF879284A6}"/>
+                <a16:creationId xmlns:a16="http://schemas.microsoft.com/office/drawing/2014/main" id="{BA27B211-5A8A-4FB1-957E-88EF879284A6}"/>
               </a:ext>
             </a:extLst>
           </p:cNvPr>
@@ -2678,7 +2678,7 @@
           <p:cNvPr id="5" name="Marcador de fecha 4">
             <a:extLst>
               <a:ext uri="{FF2B5EF4-FFF2-40B4-BE49-F238E27FC236}">
-                <a16:creationId xmlns:a16="http://schemas.microsoft.com/office/drawing/2014/main" xmlns="" id="{A6F0C929-112D-4DB7-9DF5-30EC10FD02DA}"/>
+                <a16:creationId xmlns:a16="http://schemas.microsoft.com/office/drawing/2014/main" id="{A6F0C929-112D-4DB7-9DF5-30EC10FD02DA}"/>
               </a:ext>
             </a:extLst>
           </p:cNvPr>
@@ -2707,7 +2707,7 @@
           <p:cNvPr id="6" name="Marcador de pie de página 5">
             <a:extLst>
               <a:ext uri="{FF2B5EF4-FFF2-40B4-BE49-F238E27FC236}">
-                <a16:creationId xmlns:a16="http://schemas.microsoft.com/office/drawing/2014/main" xmlns="" id="{4FA949BA-3677-4935-B15F-3C2B5CA8B23E}"/>
+                <a16:creationId xmlns:a16="http://schemas.microsoft.com/office/drawing/2014/main" id="{4FA949BA-3677-4935-B15F-3C2B5CA8B23E}"/>
               </a:ext>
             </a:extLst>
           </p:cNvPr>
@@ -2732,7 +2732,7 @@
           <p:cNvPr id="7" name="Marcador de número de diapositiva 6">
             <a:extLst>
               <a:ext uri="{FF2B5EF4-FFF2-40B4-BE49-F238E27FC236}">
-                <a16:creationId xmlns:a16="http://schemas.microsoft.com/office/drawing/2014/main" xmlns="" id="{D7EAE7A9-2E61-432A-9F3C-EEE542E3D58C}"/>
+                <a16:creationId xmlns:a16="http://schemas.microsoft.com/office/drawing/2014/main" id="{D7EAE7A9-2E61-432A-9F3C-EEE542E3D58C}"/>
               </a:ext>
             </a:extLst>
           </p:cNvPr>
@@ -2796,7 +2796,7 @@
           <p:cNvPr id="2" name="Marcador de título 1">
             <a:extLst>
               <a:ext uri="{FF2B5EF4-FFF2-40B4-BE49-F238E27FC236}">
-                <a16:creationId xmlns:a16="http://schemas.microsoft.com/office/drawing/2014/main" xmlns="" id="{44A39C9C-1D48-453D-8E99-EF6FA405742F}"/>
+                <a16:creationId xmlns:a16="http://schemas.microsoft.com/office/drawing/2014/main" id="{44A39C9C-1D48-453D-8E99-EF6FA405742F}"/>
               </a:ext>
             </a:extLst>
           </p:cNvPr>
@@ -2835,7 +2835,7 @@
           <p:cNvPr id="3" name="Marcador de texto 2">
             <a:extLst>
               <a:ext uri="{FF2B5EF4-FFF2-40B4-BE49-F238E27FC236}">
-                <a16:creationId xmlns:a16="http://schemas.microsoft.com/office/drawing/2014/main" xmlns="" id="{46840897-B604-4A80-8CFC-F2901F01061C}"/>
+                <a16:creationId xmlns:a16="http://schemas.microsoft.com/office/drawing/2014/main" id="{46840897-B604-4A80-8CFC-F2901F01061C}"/>
               </a:ext>
             </a:extLst>
           </p:cNvPr>
@@ -2903,7 +2903,7 @@
           <p:cNvPr id="4" name="Marcador de fecha 3">
             <a:extLst>
               <a:ext uri="{FF2B5EF4-FFF2-40B4-BE49-F238E27FC236}">
-                <a16:creationId xmlns:a16="http://schemas.microsoft.com/office/drawing/2014/main" xmlns="" id="{DEE54A7F-076D-4432-961A-8BA1B3664D4B}"/>
+                <a16:creationId xmlns:a16="http://schemas.microsoft.com/office/drawing/2014/main" id="{DEE54A7F-076D-4432-961A-8BA1B3664D4B}"/>
               </a:ext>
             </a:extLst>
           </p:cNvPr>
@@ -2950,7 +2950,7 @@
           <p:cNvPr id="5" name="Marcador de pie de página 4">
             <a:extLst>
               <a:ext uri="{FF2B5EF4-FFF2-40B4-BE49-F238E27FC236}">
-                <a16:creationId xmlns:a16="http://schemas.microsoft.com/office/drawing/2014/main" xmlns="" id="{59DB23C5-8A44-44B3-A9AA-7F84E10EF982}"/>
+                <a16:creationId xmlns:a16="http://schemas.microsoft.com/office/drawing/2014/main" id="{59DB23C5-8A44-44B3-A9AA-7F84E10EF982}"/>
               </a:ext>
             </a:extLst>
           </p:cNvPr>
@@ -2993,7 +2993,7 @@
           <p:cNvPr id="6" name="Marcador de número de diapositiva 5">
             <a:extLst>
               <a:ext uri="{FF2B5EF4-FFF2-40B4-BE49-F238E27FC236}">
-                <a16:creationId xmlns:a16="http://schemas.microsoft.com/office/drawing/2014/main" xmlns="" id="{CE0DA3F6-1D2F-4A82-9756-F76D59C104C1}"/>
+                <a16:creationId xmlns:a16="http://schemas.microsoft.com/office/drawing/2014/main" id="{CE0DA3F6-1D2F-4A82-9756-F76D59C104C1}"/>
               </a:ext>
             </a:extLst>
           </p:cNvPr>
@@ -3361,7 +3361,7 @@
           <p:cNvPr id="2056" name="Imagen 1">
             <a:extLst>
               <a:ext uri="{FF2B5EF4-FFF2-40B4-BE49-F238E27FC236}">
-                <a16:creationId xmlns:a16="http://schemas.microsoft.com/office/drawing/2014/main" xmlns="" id="{6C08F393-5BDF-4A9B-B67F-556F41237255}"/>
+                <a16:creationId xmlns:a16="http://schemas.microsoft.com/office/drawing/2014/main" id="{6C08F393-5BDF-4A9B-B67F-556F41237255}"/>
               </a:ext>
             </a:extLst>
           </p:cNvPr>
@@ -3408,7 +3408,7 @@
           <p:cNvPr id="8" name="Rectangle 9">
             <a:extLst>
               <a:ext uri="{FF2B5EF4-FFF2-40B4-BE49-F238E27FC236}">
-                <a16:creationId xmlns:a16="http://schemas.microsoft.com/office/drawing/2014/main" xmlns="" id="{72190031-0C09-49C1-8723-947AF39385E0}"/>
+                <a16:creationId xmlns:a16="http://schemas.microsoft.com/office/drawing/2014/main" id="{72190031-0C09-49C1-8723-947AF39385E0}"/>
               </a:ext>
             </a:extLst>
           </p:cNvPr>
@@ -3477,7 +3477,7 @@
           <p:cNvPr id="9" name="Rectangle 10">
             <a:extLst>
               <a:ext uri="{FF2B5EF4-FFF2-40B4-BE49-F238E27FC236}">
-                <a16:creationId xmlns:a16="http://schemas.microsoft.com/office/drawing/2014/main" xmlns="" id="{00E1043B-1CCB-4028-B510-30EB45F8259B}"/>
+                <a16:creationId xmlns:a16="http://schemas.microsoft.com/office/drawing/2014/main" id="{00E1043B-1CCB-4028-B510-30EB45F8259B}"/>
               </a:ext>
             </a:extLst>
           </p:cNvPr>
@@ -3535,7 +3535,7 @@
           <p:cNvPr id="11" name="Rectangle 12">
             <a:extLst>
               <a:ext uri="{FF2B5EF4-FFF2-40B4-BE49-F238E27FC236}">
-                <a16:creationId xmlns:a16="http://schemas.microsoft.com/office/drawing/2014/main" xmlns="" id="{808CCC76-0C4B-415E-8168-7B65C01761F4}"/>
+                <a16:creationId xmlns:a16="http://schemas.microsoft.com/office/drawing/2014/main" id="{808CCC76-0C4B-415E-8168-7B65C01761F4}"/>
               </a:ext>
             </a:extLst>
           </p:cNvPr>
@@ -3873,7 +3873,7 @@
           <p:cNvPr id="12" name="CuadroTexto 11">
             <a:extLst>
               <a:ext uri="{FF2B5EF4-FFF2-40B4-BE49-F238E27FC236}">
-                <a16:creationId xmlns:a16="http://schemas.microsoft.com/office/drawing/2014/main" xmlns="" id="{E4E75B4F-DBB7-459D-AD3A-83EC41E354B0}"/>
+                <a16:creationId xmlns:a16="http://schemas.microsoft.com/office/drawing/2014/main" id="{E4E75B4F-DBB7-459D-AD3A-83EC41E354B0}"/>
               </a:ext>
             </a:extLst>
           </p:cNvPr>
@@ -3910,32 +3910,21 @@
           </a:p>
           <a:p>
             <a:r>
-              <a:rPr lang="es-MX" dirty="0" smtClean="0"/>
-              <a:t>Iván </a:t>
-            </a:r>
-            <a:r>
-              <a:rPr lang="es-MX" dirty="0" err="1"/>
-              <a:t>G</a:t>
-            </a:r>
-            <a:r>
-              <a:rPr lang="es-MX" dirty="0" err="1" smtClean="0"/>
-              <a:t>arcia</a:t>
-            </a:r>
-            <a:endParaRPr lang="es-MX" dirty="0"/>
-          </a:p>
-          <a:p>
-            <a:r>
-              <a:rPr lang="es-MX" dirty="0" smtClean="0"/>
+              <a:rPr lang="es-MX" dirty="0"/>
+              <a:t>Iván García</a:t>
+            </a:r>
+          </a:p>
+          <a:p>
+            <a:r>
+              <a:rPr lang="es-MX" dirty="0"/>
               <a:t>Argelia  flores</a:t>
             </a:r>
-            <a:endParaRPr lang="es-MX" dirty="0"/>
-          </a:p>
-          <a:p>
-            <a:r>
-              <a:rPr lang="es-MX" dirty="0" smtClean="0"/>
-              <a:t>Martin   cruz</a:t>
-            </a:r>
-            <a:endParaRPr lang="es-MX" dirty="0"/>
+          </a:p>
+          <a:p>
+            <a:r>
+              <a:rPr lang="es-MX" dirty="0"/>
+              <a:t>Martin   Cruz</a:t>
+            </a:r>
           </a:p>
           <a:p>
             <a:endParaRPr lang="es-MX" dirty="0"/>
@@ -4018,13 +4007,6 @@
   <p:clrMapOvr>
     <a:masterClrMapping/>
   </p:clrMapOvr>
-  <p:timing>
-    <p:tnLst>
-      <p:par>
-        <p:cTn id="1" dur="indefinite" restart="never" nodeType="tmRoot"/>
-      </p:par>
-    </p:tnLst>
-  </p:timing>
 </p:sld>
 </file>
 
@@ -4079,13 +4061,6 @@
   <p:clrMapOvr>
     <a:masterClrMapping/>
   </p:clrMapOvr>
-  <p:timing>
-    <p:tnLst>
-      <p:par>
-        <p:cTn id="1" dur="indefinite" restart="never" nodeType="tmRoot"/>
-      </p:par>
-    </p:tnLst>
-  </p:timing>
 </p:sld>
 </file>
 
@@ -4111,7 +4086,7 @@
           <p:cNvPr id="2" name="Título 1">
             <a:extLst>
               <a:ext uri="{FF2B5EF4-FFF2-40B4-BE49-F238E27FC236}">
-                <a16:creationId xmlns:a16="http://schemas.microsoft.com/office/drawing/2014/main" xmlns="" id="{93D9CDCA-462E-45FE-8787-34330F1D08F0}"/>
+                <a16:creationId xmlns:a16="http://schemas.microsoft.com/office/drawing/2014/main" id="{93D9CDCA-462E-45FE-8787-34330F1D08F0}"/>
               </a:ext>
             </a:extLst>
           </p:cNvPr>
@@ -4140,7 +4115,7 @@
           <p:cNvPr id="3" name="Marcador de contenido 2">
             <a:extLst>
               <a:ext uri="{FF2B5EF4-FFF2-40B4-BE49-F238E27FC236}">
-                <a16:creationId xmlns:a16="http://schemas.microsoft.com/office/drawing/2014/main" xmlns="" id="{AC478F48-F8E6-4B0D-8922-28A12713F1C5}"/>
+                <a16:creationId xmlns:a16="http://schemas.microsoft.com/office/drawing/2014/main" id="{AC478F48-F8E6-4B0D-8922-28A12713F1C5}"/>
               </a:ext>
             </a:extLst>
           </p:cNvPr>
@@ -4288,13 +4263,6 @@
   <p:clrMapOvr>
     <a:masterClrMapping/>
   </p:clrMapOvr>
-  <p:timing>
-    <p:tnLst>
-      <p:par>
-        <p:cTn id="1" dur="indefinite" restart="never" nodeType="tmRoot"/>
-      </p:par>
-    </p:tnLst>
-  </p:timing>
 </p:sld>
 </file>
 
@@ -4320,7 +4288,7 @@
           <p:cNvPr id="2" name="Título 1">
             <a:extLst>
               <a:ext uri="{FF2B5EF4-FFF2-40B4-BE49-F238E27FC236}">
-                <a16:creationId xmlns:a16="http://schemas.microsoft.com/office/drawing/2014/main" xmlns="" id="{71259F6D-A389-49FC-9147-967CE58B2822}"/>
+                <a16:creationId xmlns:a16="http://schemas.microsoft.com/office/drawing/2014/main" id="{71259F6D-A389-49FC-9147-967CE58B2822}"/>
               </a:ext>
             </a:extLst>
           </p:cNvPr>
@@ -4339,7 +4307,7 @@
             <a:pPr algn="ctr"/>
             <a:r>
               <a:rPr lang="es-MX" b="1" dirty="0"/>
-              <a:t>DIAGRAMA DE FLUJO</a:t>
+              <a:t>ESQUEMA DE SITIO</a:t>
             </a:r>
             <a:endParaRPr lang="en-US" b="1" dirty="0"/>
           </a:p>
@@ -4350,7 +4318,7 @@
           <p:cNvPr id="20" name="Marcador de contenido 19" descr="Imagen que contiene Forma&#10;&#10;Descripción generada automáticamente">
             <a:extLst>
               <a:ext uri="{FF2B5EF4-FFF2-40B4-BE49-F238E27FC236}">
-                <a16:creationId xmlns:a16="http://schemas.microsoft.com/office/drawing/2014/main" xmlns="" id="{74EF096C-1434-4018-8FB2-478858E24864}"/>
+                <a16:creationId xmlns:a16="http://schemas.microsoft.com/office/drawing/2014/main" id="{74EF096C-1434-4018-8FB2-478858E24864}"/>
               </a:ext>
             </a:extLst>
           </p:cNvPr>
@@ -4385,7 +4353,7 @@
           <p:cNvPr id="22" name="Imagen 21" descr="Interfaz de usuario gráfica, Aplicación&#10;&#10;Descripción generada automáticamente">
             <a:extLst>
               <a:ext uri="{FF2B5EF4-FFF2-40B4-BE49-F238E27FC236}">
-                <a16:creationId xmlns:a16="http://schemas.microsoft.com/office/drawing/2014/main" xmlns="" id="{6FC4A6A3-745F-4FE0-A391-CC04F00944AB}"/>
+                <a16:creationId xmlns:a16="http://schemas.microsoft.com/office/drawing/2014/main" id="{6FC4A6A3-745F-4FE0-A391-CC04F00944AB}"/>
               </a:ext>
             </a:extLst>
           </p:cNvPr>
@@ -4421,7 +4389,7 @@
           <p:cNvPr id="24" name="Imagen 23" descr="Imagen que contiene Gráfico&#10;&#10;Descripción generada automáticamente">
             <a:extLst>
               <a:ext uri="{FF2B5EF4-FFF2-40B4-BE49-F238E27FC236}">
-                <a16:creationId xmlns:a16="http://schemas.microsoft.com/office/drawing/2014/main" xmlns="" id="{98BFDCE9-F007-44F7-AC06-93F71239E696}"/>
+                <a16:creationId xmlns:a16="http://schemas.microsoft.com/office/drawing/2014/main" id="{98BFDCE9-F007-44F7-AC06-93F71239E696}"/>
               </a:ext>
             </a:extLst>
           </p:cNvPr>
@@ -4457,7 +4425,7 @@
           <p:cNvPr id="26" name="Imagen 25" descr="Gráfico&#10;&#10;Descripción generada automáticamente">
             <a:extLst>
               <a:ext uri="{FF2B5EF4-FFF2-40B4-BE49-F238E27FC236}">
-                <a16:creationId xmlns:a16="http://schemas.microsoft.com/office/drawing/2014/main" xmlns="" id="{A5AB050E-A44C-4E1D-B406-11566521D716}"/>
+                <a16:creationId xmlns:a16="http://schemas.microsoft.com/office/drawing/2014/main" id="{A5AB050E-A44C-4E1D-B406-11566521D716}"/>
               </a:ext>
             </a:extLst>
           </p:cNvPr>
@@ -4493,7 +4461,7 @@
           <p:cNvPr id="28" name="Imagen 27" descr="Interfaz de usuario gráfica&#10;&#10;Descripción generada automáticamente">
             <a:extLst>
               <a:ext uri="{FF2B5EF4-FFF2-40B4-BE49-F238E27FC236}">
-                <a16:creationId xmlns:a16="http://schemas.microsoft.com/office/drawing/2014/main" xmlns="" id="{EBF5CC6C-8D51-48DC-8F06-B0034F4EAEA5}"/>
+                <a16:creationId xmlns:a16="http://schemas.microsoft.com/office/drawing/2014/main" id="{EBF5CC6C-8D51-48DC-8F06-B0034F4EAEA5}"/>
               </a:ext>
             </a:extLst>
           </p:cNvPr>
@@ -4534,13 +4502,6 @@
   <p:clrMapOvr>
     <a:masterClrMapping/>
   </p:clrMapOvr>
-  <p:timing>
-    <p:tnLst>
-      <p:par>
-        <p:cTn id="1" dur="indefinite" restart="never" nodeType="tmRoot"/>
-      </p:par>
-    </p:tnLst>
-  </p:timing>
 </p:sld>
 </file>
 
@@ -4577,10 +4538,9 @@
           <a:lstStyle/>
           <a:p>
             <a:r>
-              <a:rPr lang="es-ES" dirty="0" smtClean="0"/>
+              <a:rPr lang="es-ES" dirty="0"/>
               <a:t>ACUARIO</a:t>
             </a:r>
-            <a:endParaRPr lang="es-ES" dirty="0"/>
           </a:p>
         </p:txBody>
       </p:sp>
@@ -4662,7 +4622,7 @@
           <p:cNvPr id="2" name="Título 1">
             <a:extLst>
               <a:ext uri="{FF2B5EF4-FFF2-40B4-BE49-F238E27FC236}">
-                <a16:creationId xmlns:a16="http://schemas.microsoft.com/office/drawing/2014/main" xmlns="" id="{76BEA198-CB59-4C84-B707-B3C883A3E1B1}"/>
+                <a16:creationId xmlns:a16="http://schemas.microsoft.com/office/drawing/2014/main" id="{76BEA198-CB59-4C84-B707-B3C883A3E1B1}"/>
               </a:ext>
             </a:extLst>
           </p:cNvPr>
@@ -4691,7 +4651,7 @@
           <p:cNvPr id="3" name="Marcador de contenido 2">
             <a:extLst>
               <a:ext uri="{FF2B5EF4-FFF2-40B4-BE49-F238E27FC236}">
-                <a16:creationId xmlns:a16="http://schemas.microsoft.com/office/drawing/2014/main" xmlns="" id="{160F859C-6BB9-4D44-A0A7-203E0FEAFBCA}"/>
+                <a16:creationId xmlns:a16="http://schemas.microsoft.com/office/drawing/2014/main" id="{160F859C-6BB9-4D44-A0A7-203E0FEAFBCA}"/>
               </a:ext>
             </a:extLst>
           </p:cNvPr>
@@ -4755,13 +4715,6 @@
   <p:clrMapOvr>
     <a:masterClrMapping/>
   </p:clrMapOvr>
-  <p:timing>
-    <p:tnLst>
-      <p:par>
-        <p:cTn id="1" dur="indefinite" restart="never" nodeType="tmRoot"/>
-      </p:par>
-    </p:tnLst>
-  </p:timing>
 </p:sld>
 </file>
 
@@ -4787,7 +4740,7 @@
           <p:cNvPr id="2" name="Título 1">
             <a:extLst>
               <a:ext uri="{FF2B5EF4-FFF2-40B4-BE49-F238E27FC236}">
-                <a16:creationId xmlns:a16="http://schemas.microsoft.com/office/drawing/2014/main" xmlns="" id="{B5B9506F-6AFB-497E-AC40-EFAC9419D818}"/>
+                <a16:creationId xmlns:a16="http://schemas.microsoft.com/office/drawing/2014/main" id="{B5B9506F-6AFB-497E-AC40-EFAC9419D818}"/>
               </a:ext>
             </a:extLst>
           </p:cNvPr>
@@ -4816,7 +4769,7 @@
           <p:cNvPr id="3" name="Marcador de contenido 2">
             <a:extLst>
               <a:ext uri="{FF2B5EF4-FFF2-40B4-BE49-F238E27FC236}">
-                <a16:creationId xmlns:a16="http://schemas.microsoft.com/office/drawing/2014/main" xmlns="" id="{0A5EE1EF-7B26-4CBB-B851-ACAB36CCFE70}"/>
+                <a16:creationId xmlns:a16="http://schemas.microsoft.com/office/drawing/2014/main" id="{0A5EE1EF-7B26-4CBB-B851-ACAB36CCFE70}"/>
               </a:ext>
             </a:extLst>
           </p:cNvPr>
@@ -4880,13 +4833,6 @@
   <p:clrMapOvr>
     <a:masterClrMapping/>
   </p:clrMapOvr>
-  <p:timing>
-    <p:tnLst>
-      <p:par>
-        <p:cTn id="1" dur="indefinite" restart="never" nodeType="tmRoot"/>
-      </p:par>
-    </p:tnLst>
-  </p:timing>
 </p:sld>
 </file>
 
@@ -4912,7 +4858,7 @@
           <p:cNvPr id="2" name="Título 1">
             <a:extLst>
               <a:ext uri="{FF2B5EF4-FFF2-40B4-BE49-F238E27FC236}">
-                <a16:creationId xmlns:a16="http://schemas.microsoft.com/office/drawing/2014/main" xmlns="" id="{75CD6347-2E13-4700-9352-BA7296395594}"/>
+                <a16:creationId xmlns:a16="http://schemas.microsoft.com/office/drawing/2014/main" id="{75CD6347-2E13-4700-9352-BA7296395594}"/>
               </a:ext>
             </a:extLst>
           </p:cNvPr>
@@ -4941,7 +4887,7 @@
           <p:cNvPr id="3" name="Marcador de contenido 2">
             <a:extLst>
               <a:ext uri="{FF2B5EF4-FFF2-40B4-BE49-F238E27FC236}">
-                <a16:creationId xmlns:a16="http://schemas.microsoft.com/office/drawing/2014/main" xmlns="" id="{90FFABA1-8CEE-4FE0-89A7-68D8182EE88E}"/>
+                <a16:creationId xmlns:a16="http://schemas.microsoft.com/office/drawing/2014/main" id="{90FFABA1-8CEE-4FE0-89A7-68D8182EE88E}"/>
               </a:ext>
             </a:extLst>
           </p:cNvPr>
@@ -4991,13 +4937,6 @@
   <p:clrMapOvr>
     <a:masterClrMapping/>
   </p:clrMapOvr>
-  <p:timing>
-    <p:tnLst>
-      <p:par>
-        <p:cTn id="1" dur="indefinite" restart="never" nodeType="tmRoot"/>
-      </p:par>
-    </p:tnLst>
-  </p:timing>
 </p:sld>
 </file>
 
@@ -5023,7 +4962,7 @@
           <p:cNvPr id="2" name="Título 1">
             <a:extLst>
               <a:ext uri="{FF2B5EF4-FFF2-40B4-BE49-F238E27FC236}">
-                <a16:creationId xmlns:a16="http://schemas.microsoft.com/office/drawing/2014/main" xmlns="" id="{7312D0B6-E241-478D-9BEB-4DBF10071539}"/>
+                <a16:creationId xmlns:a16="http://schemas.microsoft.com/office/drawing/2014/main" id="{7312D0B6-E241-478D-9BEB-4DBF10071539}"/>
               </a:ext>
             </a:extLst>
           </p:cNvPr>
@@ -5052,7 +4991,7 @@
           <p:cNvPr id="3" name="Marcador de contenido 2">
             <a:extLst>
               <a:ext uri="{FF2B5EF4-FFF2-40B4-BE49-F238E27FC236}">
-                <a16:creationId xmlns:a16="http://schemas.microsoft.com/office/drawing/2014/main" xmlns="" id="{7B1C689C-8FFC-47A5-AB31-E3BBF6CBB875}"/>
+                <a16:creationId xmlns:a16="http://schemas.microsoft.com/office/drawing/2014/main" id="{7B1C689C-8FFC-47A5-AB31-E3BBF6CBB875}"/>
               </a:ext>
             </a:extLst>
           </p:cNvPr>
@@ -5097,13 +5036,6 @@
   <p:clrMapOvr>
     <a:masterClrMapping/>
   </p:clrMapOvr>
-  <p:timing>
-    <p:tnLst>
-      <p:par>
-        <p:cTn id="1" dur="indefinite" restart="never" nodeType="tmRoot"/>
-      </p:par>
-    </p:tnLst>
-  </p:timing>
 </p:sld>
 </file>
 
@@ -5129,7 +5061,7 @@
           <p:cNvPr id="2" name="Título 1">
             <a:extLst>
               <a:ext uri="{FF2B5EF4-FFF2-40B4-BE49-F238E27FC236}">
-                <a16:creationId xmlns:a16="http://schemas.microsoft.com/office/drawing/2014/main" xmlns="" id="{20D060C7-C059-4BD5-8153-DAEAF0CB482B}"/>
+                <a16:creationId xmlns:a16="http://schemas.microsoft.com/office/drawing/2014/main" id="{20D060C7-C059-4BD5-8153-DAEAF0CB482B}"/>
               </a:ext>
             </a:extLst>
           </p:cNvPr>
@@ -5158,7 +5090,7 @@
           <p:cNvPr id="3" name="Marcador de contenido 2">
             <a:extLst>
               <a:ext uri="{FF2B5EF4-FFF2-40B4-BE49-F238E27FC236}">
-                <a16:creationId xmlns:a16="http://schemas.microsoft.com/office/drawing/2014/main" xmlns="" id="{1F846BC0-6844-4CA8-8423-6D7A2F9BEBA0}"/>
+                <a16:creationId xmlns:a16="http://schemas.microsoft.com/office/drawing/2014/main" id="{1F846BC0-6844-4CA8-8423-6D7A2F9BEBA0}"/>
               </a:ext>
             </a:extLst>
           </p:cNvPr>
@@ -5204,13 +5136,6 @@
   <p:clrMapOvr>
     <a:masterClrMapping/>
   </p:clrMapOvr>
-  <p:timing>
-    <p:tnLst>
-      <p:par>
-        <p:cTn id="1" dur="indefinite" restart="never" nodeType="tmRoot"/>
-      </p:par>
-    </p:tnLst>
-  </p:timing>
 </p:sld>
 </file>
 

</xml_diff>